<commit_message>
added code to hash board
dad
</commit_message>
<xml_diff>
--- a/game-design.pptx
+++ b/game-design.pptx
@@ -5,7 +5,7 @@
     <p:sldMasterId id="2147483648" r:id="rId1"/>
   </p:sldMasterIdLst>
   <p:notesMasterIdLst>
-    <p:notesMasterId r:id="rId10"/>
+    <p:notesMasterId r:id="rId11"/>
   </p:notesMasterIdLst>
   <p:sldIdLst>
     <p:sldId id="256" r:id="rId2"/>
@@ -14,8 +14,9 @@
     <p:sldId id="258" r:id="rId5"/>
     <p:sldId id="259" r:id="rId6"/>
     <p:sldId id="262" r:id="rId7"/>
-    <p:sldId id="260" r:id="rId8"/>
-    <p:sldId id="263" r:id="rId9"/>
+    <p:sldId id="264" r:id="rId8"/>
+    <p:sldId id="260" r:id="rId9"/>
+    <p:sldId id="263" r:id="rId10"/>
   </p:sldIdLst>
   <p:sldSz cx="12192000" cy="6858000"/>
   <p:notesSz cx="6858000" cy="9144000"/>
@@ -204,7 +205,7 @@
           <a:p>
             <a:fld id="{434830F7-E37E-B44F-BC37-DC975D0CE6F2}" type="datetimeFigureOut">
               <a:rPr lang="en-US" smtClean="0"/>
-              <a:t>11/25/17</a:t>
+              <a:t>11/30/17</a:t>
             </a:fld>
             <a:endParaRPr lang="en-US"/>
           </a:p>
@@ -537,7 +538,7 @@
           <a:p>
             <a:fld id="{7AE21005-C3B7-CB47-B236-56AD3B774F8B}" type="slidenum">
               <a:rPr lang="en-US" smtClean="0"/>
-              <a:t>8</a:t>
+              <a:t>9</a:t>
             </a:fld>
             <a:endParaRPr lang="en-US"/>
           </a:p>
@@ -687,7 +688,7 @@
           <a:p>
             <a:fld id="{8FCC3955-C6A8-774F-B0EE-EB96B2844D27}" type="datetimeFigureOut">
               <a:rPr lang="en-US" smtClean="0"/>
-              <a:t>11/25/17</a:t>
+              <a:t>11/30/17</a:t>
             </a:fld>
             <a:endParaRPr lang="en-US"/>
           </a:p>
@@ -857,7 +858,7 @@
           <a:p>
             <a:fld id="{8FCC3955-C6A8-774F-B0EE-EB96B2844D27}" type="datetimeFigureOut">
               <a:rPr lang="en-US" smtClean="0"/>
-              <a:t>11/25/17</a:t>
+              <a:t>11/30/17</a:t>
             </a:fld>
             <a:endParaRPr lang="en-US"/>
           </a:p>
@@ -1037,7 +1038,7 @@
           <a:p>
             <a:fld id="{8FCC3955-C6A8-774F-B0EE-EB96B2844D27}" type="datetimeFigureOut">
               <a:rPr lang="en-US" smtClean="0"/>
-              <a:t>11/25/17</a:t>
+              <a:t>11/30/17</a:t>
             </a:fld>
             <a:endParaRPr lang="en-US"/>
           </a:p>
@@ -1207,7 +1208,7 @@
           <a:p>
             <a:fld id="{8FCC3955-C6A8-774F-B0EE-EB96B2844D27}" type="datetimeFigureOut">
               <a:rPr lang="en-US" smtClean="0"/>
-              <a:t>11/25/17</a:t>
+              <a:t>11/30/17</a:t>
             </a:fld>
             <a:endParaRPr lang="en-US"/>
           </a:p>
@@ -1453,7 +1454,7 @@
           <a:p>
             <a:fld id="{8FCC3955-C6A8-774F-B0EE-EB96B2844D27}" type="datetimeFigureOut">
               <a:rPr lang="en-US" smtClean="0"/>
-              <a:t>11/25/17</a:t>
+              <a:t>11/30/17</a:t>
             </a:fld>
             <a:endParaRPr lang="en-US"/>
           </a:p>
@@ -1685,7 +1686,7 @@
           <a:p>
             <a:fld id="{8FCC3955-C6A8-774F-B0EE-EB96B2844D27}" type="datetimeFigureOut">
               <a:rPr lang="en-US" smtClean="0"/>
-              <a:t>11/25/17</a:t>
+              <a:t>11/30/17</a:t>
             </a:fld>
             <a:endParaRPr lang="en-US"/>
           </a:p>
@@ -2052,7 +2053,7 @@
           <a:p>
             <a:fld id="{8FCC3955-C6A8-774F-B0EE-EB96B2844D27}" type="datetimeFigureOut">
               <a:rPr lang="en-US" smtClean="0"/>
-              <a:t>11/25/17</a:t>
+              <a:t>11/30/17</a:t>
             </a:fld>
             <a:endParaRPr lang="en-US"/>
           </a:p>
@@ -2170,7 +2171,7 @@
           <a:p>
             <a:fld id="{8FCC3955-C6A8-774F-B0EE-EB96B2844D27}" type="datetimeFigureOut">
               <a:rPr lang="en-US" smtClean="0"/>
-              <a:t>11/25/17</a:t>
+              <a:t>11/30/17</a:t>
             </a:fld>
             <a:endParaRPr lang="en-US"/>
           </a:p>
@@ -2265,7 +2266,7 @@
           <a:p>
             <a:fld id="{8FCC3955-C6A8-774F-B0EE-EB96B2844D27}" type="datetimeFigureOut">
               <a:rPr lang="en-US" smtClean="0"/>
-              <a:t>11/25/17</a:t>
+              <a:t>11/30/17</a:t>
             </a:fld>
             <a:endParaRPr lang="en-US"/>
           </a:p>
@@ -2542,7 +2543,7 @@
           <a:p>
             <a:fld id="{8FCC3955-C6A8-774F-B0EE-EB96B2844D27}" type="datetimeFigureOut">
               <a:rPr lang="en-US" smtClean="0"/>
-              <a:t>11/25/17</a:t>
+              <a:t>11/30/17</a:t>
             </a:fld>
             <a:endParaRPr lang="en-US"/>
           </a:p>
@@ -2795,7 +2796,7 @@
           <a:p>
             <a:fld id="{8FCC3955-C6A8-774F-B0EE-EB96B2844D27}" type="datetimeFigureOut">
               <a:rPr lang="en-US" smtClean="0"/>
-              <a:t>11/25/17</a:t>
+              <a:t>11/30/17</a:t>
             </a:fld>
             <a:endParaRPr lang="en-US"/>
           </a:p>
@@ -3008,7 +3009,7 @@
           <a:p>
             <a:fld id="{8FCC3955-C6A8-774F-B0EE-EB96B2844D27}" type="datetimeFigureOut">
               <a:rPr lang="en-US" smtClean="0"/>
-              <a:t>11/25/17</a:t>
+              <a:t>11/30/17</a:t>
             </a:fld>
             <a:endParaRPr lang="en-US"/>
           </a:p>
@@ -12206,6 +12207,86 @@
           <a:p>
             <a:r>
               <a:rPr lang="en-US" dirty="0" smtClean="0"/>
+              <a:t>Calculating best moves</a:t>
+            </a:r>
+            <a:endParaRPr lang="en-US" dirty="0"/>
+          </a:p>
+        </p:txBody>
+      </p:sp>
+      <p:sp>
+        <p:nvSpPr>
+          <p:cNvPr id="3" name="Content Placeholder 2"/>
+          <p:cNvSpPr>
+            <a:spLocks noGrp="1"/>
+          </p:cNvSpPr>
+          <p:nvPr>
+            <p:ph idx="1"/>
+          </p:nvPr>
+        </p:nvSpPr>
+        <p:spPr/>
+        <p:txBody>
+          <a:bodyPr/>
+          <a:lstStyle/>
+          <a:p>
+            <a:r>
+              <a:rPr lang="en-US" dirty="0" smtClean="0"/>
+              <a:t>Risk that </a:t>
+            </a:r>
+            <a:r>
+              <a:rPr lang="en-US" smtClean="0"/>
+              <a:t>some moves don’t </a:t>
+            </a:r>
+            <a:endParaRPr lang="en-US"/>
+          </a:p>
+        </p:txBody>
+      </p:sp>
+    </p:spTree>
+    <p:extLst>
+      <p:ext uri="{BB962C8B-B14F-4D97-AF65-F5344CB8AC3E}">
+        <p14:creationId xmlns:p14="http://schemas.microsoft.com/office/powerpoint/2010/main" val="200337704"/>
+      </p:ext>
+    </p:extLst>
+  </p:cSld>
+  <p:clrMapOvr>
+    <a:masterClrMapping/>
+  </p:clrMapOvr>
+</p:sld>
+</file>
+
+<file path=ppt/slides/slide8.xml><?xml version="1.0" encoding="utf-8"?>
+<p:sld xmlns:a="http://schemas.openxmlformats.org/drawingml/2006/main" xmlns:r="http://schemas.openxmlformats.org/officeDocument/2006/relationships" xmlns:p="http://schemas.openxmlformats.org/presentationml/2006/main">
+  <p:cSld>
+    <p:spTree>
+      <p:nvGrpSpPr>
+        <p:cNvPr id="1" name=""/>
+        <p:cNvGrpSpPr/>
+        <p:nvPr/>
+      </p:nvGrpSpPr>
+      <p:grpSpPr>
+        <a:xfrm>
+          <a:off x="0" y="0"/>
+          <a:ext cx="0" cy="0"/>
+          <a:chOff x="0" y="0"/>
+          <a:chExt cx="0" cy="0"/>
+        </a:xfrm>
+      </p:grpSpPr>
+      <p:sp>
+        <p:nvSpPr>
+          <p:cNvPr id="2" name="Title 1"/>
+          <p:cNvSpPr>
+            <a:spLocks noGrp="1"/>
+          </p:cNvSpPr>
+          <p:nvPr>
+            <p:ph type="title"/>
+          </p:nvPr>
+        </p:nvSpPr>
+        <p:spPr/>
+        <p:txBody>
+          <a:bodyPr/>
+          <a:lstStyle/>
+          <a:p>
+            <a:r>
+              <a:rPr lang="en-US" dirty="0" smtClean="0"/>
               <a:t>Flaws in the process (improvement opportunities)</a:t>
             </a:r>
             <a:endParaRPr lang="en-US" dirty="0"/>
@@ -12260,7 +12341,7 @@
 </p:sld>
 </file>
 
-<file path=ppt/slides/slide8.xml><?xml version="1.0" encoding="utf-8"?>
+<file path=ppt/slides/slide9.xml><?xml version="1.0" encoding="utf-8"?>
 <p:sld xmlns:a="http://schemas.openxmlformats.org/drawingml/2006/main" xmlns:r="http://schemas.openxmlformats.org/officeDocument/2006/relationships" xmlns:p="http://schemas.openxmlformats.org/presentationml/2006/main">
   <p:cSld>
     <p:spTree>

</xml_diff>